<commit_message>
Added in ChemE 486 content to syllabus.
</commit_message>
<xml_diff>
--- a/images/logo2.pptx
+++ b/images/logo2.pptx
@@ -104,6 +104,11 @@
       </a:defRPr>
     </a:lvl9pPr>
   </p:defaultTextStyle>
+  <p:extLst>
+    <p:ext uri="{EFAFB233-063F-42B5-8137-9DF3F51BA10A}">
+      <p15:sldGuideLst xmlns:p15="http://schemas.microsoft.com/office/powerpoint/2012/main"/>
+    </p:ext>
+  </p:extLst>
 </p:presentation>
 </file>
 
@@ -254,7 +259,7 @@
           <a:p>
             <a:fld id="{09AD312A-F47F-4F50-9CE5-1E8EE3C1E169}" type="datetimeFigureOut">
               <a:rPr lang="en-US" smtClean="0"/>
-              <a:t>11/13/2019</a:t>
+              <a:t>2/11/2020</a:t>
             </a:fld>
             <a:endParaRPr lang="en-US"/>
           </a:p>
@@ -452,7 +457,7 @@
           <a:p>
             <a:fld id="{09AD312A-F47F-4F50-9CE5-1E8EE3C1E169}" type="datetimeFigureOut">
               <a:rPr lang="en-US" smtClean="0"/>
-              <a:t>11/13/2019</a:t>
+              <a:t>2/11/2020</a:t>
             </a:fld>
             <a:endParaRPr lang="en-US"/>
           </a:p>
@@ -660,7 +665,7 @@
           <a:p>
             <a:fld id="{09AD312A-F47F-4F50-9CE5-1E8EE3C1E169}" type="datetimeFigureOut">
               <a:rPr lang="en-US" smtClean="0"/>
-              <a:t>11/13/2019</a:t>
+              <a:t>2/11/2020</a:t>
             </a:fld>
             <a:endParaRPr lang="en-US"/>
           </a:p>
@@ -858,7 +863,7 @@
           <a:p>
             <a:fld id="{09AD312A-F47F-4F50-9CE5-1E8EE3C1E169}" type="datetimeFigureOut">
               <a:rPr lang="en-US" smtClean="0"/>
-              <a:t>11/13/2019</a:t>
+              <a:t>2/11/2020</a:t>
             </a:fld>
             <a:endParaRPr lang="en-US"/>
           </a:p>
@@ -1133,7 +1138,7 @@
           <a:p>
             <a:fld id="{09AD312A-F47F-4F50-9CE5-1E8EE3C1E169}" type="datetimeFigureOut">
               <a:rPr lang="en-US" smtClean="0"/>
-              <a:t>11/13/2019</a:t>
+              <a:t>2/11/2020</a:t>
             </a:fld>
             <a:endParaRPr lang="en-US"/>
           </a:p>
@@ -1398,7 +1403,7 @@
           <a:p>
             <a:fld id="{09AD312A-F47F-4F50-9CE5-1E8EE3C1E169}" type="datetimeFigureOut">
               <a:rPr lang="en-US" smtClean="0"/>
-              <a:t>11/13/2019</a:t>
+              <a:t>2/11/2020</a:t>
             </a:fld>
             <a:endParaRPr lang="en-US"/>
           </a:p>
@@ -1810,7 +1815,7 @@
           <a:p>
             <a:fld id="{09AD312A-F47F-4F50-9CE5-1E8EE3C1E169}" type="datetimeFigureOut">
               <a:rPr lang="en-US" smtClean="0"/>
-              <a:t>11/13/2019</a:t>
+              <a:t>2/11/2020</a:t>
             </a:fld>
             <a:endParaRPr lang="en-US"/>
           </a:p>
@@ -1951,7 +1956,7 @@
           <a:p>
             <a:fld id="{09AD312A-F47F-4F50-9CE5-1E8EE3C1E169}" type="datetimeFigureOut">
               <a:rPr lang="en-US" smtClean="0"/>
-              <a:t>11/13/2019</a:t>
+              <a:t>2/11/2020</a:t>
             </a:fld>
             <a:endParaRPr lang="en-US"/>
           </a:p>
@@ -2064,7 +2069,7 @@
           <a:p>
             <a:fld id="{09AD312A-F47F-4F50-9CE5-1E8EE3C1E169}" type="datetimeFigureOut">
               <a:rPr lang="en-US" smtClean="0"/>
-              <a:t>11/13/2019</a:t>
+              <a:t>2/11/2020</a:t>
             </a:fld>
             <a:endParaRPr lang="en-US"/>
           </a:p>
@@ -2375,7 +2380,7 @@
           <a:p>
             <a:fld id="{09AD312A-F47F-4F50-9CE5-1E8EE3C1E169}" type="datetimeFigureOut">
               <a:rPr lang="en-US" smtClean="0"/>
-              <a:t>11/13/2019</a:t>
+              <a:t>2/11/2020</a:t>
             </a:fld>
             <a:endParaRPr lang="en-US"/>
           </a:p>
@@ -2663,7 +2668,7 @@
           <a:p>
             <a:fld id="{09AD312A-F47F-4F50-9CE5-1E8EE3C1E169}" type="datetimeFigureOut">
               <a:rPr lang="en-US" smtClean="0"/>
-              <a:t>11/13/2019</a:t>
+              <a:t>2/11/2020</a:t>
             </a:fld>
             <a:endParaRPr lang="en-US"/>
           </a:p>
@@ -2904,7 +2909,7 @@
           <a:p>
             <a:fld id="{09AD312A-F47F-4F50-9CE5-1E8EE3C1E169}" type="datetimeFigureOut">
               <a:rPr lang="en-US" smtClean="0"/>
-              <a:t>11/13/2019</a:t>
+              <a:t>2/11/2020</a:t>
             </a:fld>
             <a:endParaRPr lang="en-US"/>
           </a:p>
@@ -3513,193 +3518,255 @@
                   <a:latin typeface="Georgia Pro Black" panose="020B0604020202020204" pitchFamily="18" charset="0"/>
                   <a:cs typeface="Aharoni" panose="020B0604020202020204" pitchFamily="2" charset="-79"/>
                 </a:rPr>
-                <a:t>5</a:t>
+                <a:t>6</a:t>
               </a:r>
             </a:p>
           </p:txBody>
         </p:sp>
       </p:grpSp>
-      <p:sp>
-        <p:nvSpPr>
-          <p:cNvPr id="12" name="Oval 11">
-            <a:extLst>
-              <a:ext uri="{FF2B5EF4-FFF2-40B4-BE49-F238E27FC236}">
-                <a16:creationId xmlns:a16="http://schemas.microsoft.com/office/drawing/2014/main" id="{06AE2DA3-6278-45F7-A589-89E792E05A1A}"/>
-              </a:ext>
-            </a:extLst>
-          </p:cNvPr>
-          <p:cNvSpPr/>
+      <p:grpSp>
+        <p:nvGrpSpPr>
+          <p:cNvPr id="13" name="Group 12">
+            <a:extLst>
+              <a:ext uri="{FF2B5EF4-FFF2-40B4-BE49-F238E27FC236}">
+                <a16:creationId xmlns:a16="http://schemas.microsoft.com/office/drawing/2014/main" id="{DF67CE61-0D9A-47E8-8B14-34B649FF9CE5}"/>
+              </a:ext>
+            </a:extLst>
+          </p:cNvPr>
+          <p:cNvGrpSpPr/>
           <p:nvPr/>
-        </p:nvSpPr>
-        <p:spPr>
+        </p:nvGrpSpPr>
+        <p:grpSpPr>
           <a:xfrm>
-            <a:off x="2257746" y="1611004"/>
-            <a:ext cx="1802524" cy="1802524"/>
+            <a:off x="2335385" y="776376"/>
+            <a:ext cx="1589635" cy="3441940"/>
+            <a:chOff x="2257746" y="690113"/>
+            <a:chExt cx="1589635" cy="3441940"/>
           </a:xfrm>
-          <a:prstGeom prst="ellipse">
-            <a:avLst/>
-          </a:prstGeom>
-          <a:noFill/>
-          <a:ln w="133350">
-            <a:solidFill>
-              <a:schemeClr val="bg1"/>
-            </a:solidFill>
-          </a:ln>
-        </p:spPr>
-        <p:style>
-          <a:lnRef idx="2">
-            <a:schemeClr val="accent1">
-              <a:shade val="50000"/>
-            </a:schemeClr>
-          </a:lnRef>
-          <a:fillRef idx="1">
-            <a:schemeClr val="accent1"/>
-          </a:fillRef>
-          <a:effectRef idx="0">
-            <a:schemeClr val="accent1"/>
-          </a:effectRef>
-          <a:fontRef idx="minor">
-            <a:schemeClr val="lt1"/>
-          </a:fontRef>
-        </p:style>
-        <p:txBody>
-          <a:bodyPr rtlCol="0" anchor="ctr"/>
-          <a:lstStyle/>
-          <a:p>
-            <a:pPr algn="ctr"/>
-            <a:endParaRPr lang="en-US"/>
-          </a:p>
-        </p:txBody>
-      </p:sp>
-      <p:cxnSp>
-        <p:nvCxnSpPr>
-          <p:cNvPr id="14" name="Straight Connector 13">
-            <a:extLst>
-              <a:ext uri="{FF2B5EF4-FFF2-40B4-BE49-F238E27FC236}">
-                <a16:creationId xmlns:a16="http://schemas.microsoft.com/office/drawing/2014/main" id="{05BBB9D4-C047-49C9-9E12-1F1615E193B0}"/>
-              </a:ext>
-            </a:extLst>
-          </p:cNvPr>
-          <p:cNvCxnSpPr>
-            <a:cxnSpLocks/>
-          </p:cNvCxnSpPr>
-          <p:nvPr/>
-        </p:nvCxnSpPr>
-        <p:spPr>
-          <a:xfrm>
-            <a:off x="2146665" y="1592904"/>
-            <a:ext cx="821724" cy="1144413"/>
-          </a:xfrm>
-          <a:prstGeom prst="line">
-            <a:avLst/>
-          </a:prstGeom>
-          <a:ln w="133350">
-            <a:solidFill>
-              <a:schemeClr val="bg1"/>
-            </a:solidFill>
-          </a:ln>
-        </p:spPr>
-        <p:style>
-          <a:lnRef idx="1">
-            <a:schemeClr val="accent1"/>
-          </a:lnRef>
-          <a:fillRef idx="0">
-            <a:schemeClr val="accent1"/>
-          </a:fillRef>
-          <a:effectRef idx="0">
-            <a:schemeClr val="accent1"/>
-          </a:effectRef>
-          <a:fontRef idx="minor">
-            <a:schemeClr val="tx1"/>
-          </a:fontRef>
-        </p:style>
-      </p:cxnSp>
-      <p:cxnSp>
-        <p:nvCxnSpPr>
-          <p:cNvPr id="16" name="Straight Connector 15">
-            <a:extLst>
-              <a:ext uri="{FF2B5EF4-FFF2-40B4-BE49-F238E27FC236}">
-                <a16:creationId xmlns:a16="http://schemas.microsoft.com/office/drawing/2014/main" id="{9072ED4D-5286-46F9-958B-A366C414056A}"/>
-              </a:ext>
-            </a:extLst>
-          </p:cNvPr>
-          <p:cNvCxnSpPr>
-            <a:cxnSpLocks/>
-          </p:cNvCxnSpPr>
-          <p:nvPr/>
-        </p:nvCxnSpPr>
-        <p:spPr>
-          <a:xfrm>
-            <a:off x="3415230" y="2272486"/>
-            <a:ext cx="821724" cy="1144413"/>
-          </a:xfrm>
-          <a:prstGeom prst="line">
-            <a:avLst/>
-          </a:prstGeom>
-          <a:ln w="133350">
-            <a:solidFill>
-              <a:schemeClr val="bg1"/>
-            </a:solidFill>
-          </a:ln>
-        </p:spPr>
-        <p:style>
-          <a:lnRef idx="1">
-            <a:schemeClr val="accent1"/>
-          </a:lnRef>
-          <a:fillRef idx="0">
-            <a:schemeClr val="accent1"/>
-          </a:fillRef>
-          <a:effectRef idx="0">
-            <a:schemeClr val="accent1"/>
-          </a:effectRef>
-          <a:fontRef idx="minor">
-            <a:schemeClr val="tx1"/>
-          </a:fontRef>
-        </p:style>
-      </p:cxnSp>
-      <p:cxnSp>
-        <p:nvCxnSpPr>
-          <p:cNvPr id="19" name="Straight Connector 18">
-            <a:extLst>
-              <a:ext uri="{FF2B5EF4-FFF2-40B4-BE49-F238E27FC236}">
-                <a16:creationId xmlns:a16="http://schemas.microsoft.com/office/drawing/2014/main" id="{C31EB60D-3C83-49C3-97BC-2E498C53A7F8}"/>
-              </a:ext>
-            </a:extLst>
-          </p:cNvPr>
-          <p:cNvCxnSpPr>
-            <a:cxnSpLocks/>
-          </p:cNvCxnSpPr>
-          <p:nvPr/>
-        </p:nvCxnSpPr>
-        <p:spPr>
-          <a:xfrm flipV="1">
-            <a:off x="2919185" y="2274820"/>
-            <a:ext cx="572792" cy="411283"/>
-          </a:xfrm>
-          <a:prstGeom prst="line">
-            <a:avLst/>
-          </a:prstGeom>
-          <a:ln w="133350">
-            <a:solidFill>
-              <a:schemeClr val="bg1"/>
-            </a:solidFill>
-          </a:ln>
-        </p:spPr>
-        <p:style>
-          <a:lnRef idx="1">
-            <a:schemeClr val="accent1"/>
-          </a:lnRef>
-          <a:fillRef idx="0">
-            <a:schemeClr val="accent1"/>
-          </a:fillRef>
-          <a:effectRef idx="0">
-            <a:schemeClr val="accent1"/>
-          </a:effectRef>
-          <a:fontRef idx="minor">
-            <a:schemeClr val="tx1"/>
-          </a:fontRef>
-        </p:style>
-      </p:cxnSp>
+        </p:grpSpPr>
+        <p:sp>
+          <p:nvSpPr>
+            <p:cNvPr id="2" name="Rectangle: Rounded Corners 1">
+              <a:extLst>
+                <a:ext uri="{FF2B5EF4-FFF2-40B4-BE49-F238E27FC236}">
+                  <a16:creationId xmlns:a16="http://schemas.microsoft.com/office/drawing/2014/main" id="{70CE3E76-8200-4769-9AD3-BE59488F2B74}"/>
+                </a:ext>
+              </a:extLst>
+            </p:cNvPr>
+            <p:cNvSpPr/>
+            <p:nvPr/>
+          </p:nvSpPr>
+          <p:spPr>
+            <a:xfrm>
+              <a:off x="2257746" y="690113"/>
+              <a:ext cx="1589635" cy="3441940"/>
+            </a:xfrm>
+            <a:prstGeom prst="roundRect">
+              <a:avLst>
+                <a:gd name="adj" fmla="val 33490"/>
+              </a:avLst>
+            </a:prstGeom>
+            <a:noFill/>
+            <a:ln w="171450">
+              <a:solidFill>
+                <a:schemeClr val="bg1"/>
+              </a:solidFill>
+            </a:ln>
+          </p:spPr>
+          <p:style>
+            <a:lnRef idx="2">
+              <a:schemeClr val="accent1">
+                <a:shade val="50000"/>
+              </a:schemeClr>
+            </a:lnRef>
+            <a:fillRef idx="1">
+              <a:schemeClr val="accent1"/>
+            </a:fillRef>
+            <a:effectRef idx="0">
+              <a:schemeClr val="accent1"/>
+            </a:effectRef>
+            <a:fontRef idx="minor">
+              <a:schemeClr val="lt1"/>
+            </a:fontRef>
+          </p:style>
+          <p:txBody>
+            <a:bodyPr rtlCol="0" anchor="ctr"/>
+            <a:lstStyle/>
+            <a:p>
+              <a:pPr algn="ctr"/>
+              <a:endParaRPr lang="en-US"/>
+            </a:p>
+          </p:txBody>
+        </p:sp>
+        <p:cxnSp>
+          <p:nvCxnSpPr>
+            <p:cNvPr id="9" name="Straight Connector 8">
+              <a:extLst>
+                <a:ext uri="{FF2B5EF4-FFF2-40B4-BE49-F238E27FC236}">
+                  <a16:creationId xmlns:a16="http://schemas.microsoft.com/office/drawing/2014/main" id="{B8D3FF24-C87F-4FA4-8B9B-3C6798220A1C}"/>
+                </a:ext>
+              </a:extLst>
+            </p:cNvPr>
+            <p:cNvCxnSpPr/>
+            <p:nvPr/>
+          </p:nvCxnSpPr>
+          <p:spPr>
+            <a:xfrm>
+              <a:off x="2257746" y="1130060"/>
+              <a:ext cx="1520624" cy="0"/>
+            </a:xfrm>
+            <a:prstGeom prst="line">
+              <a:avLst/>
+            </a:prstGeom>
+            <a:ln w="133350">
+              <a:solidFill>
+                <a:schemeClr val="bg1"/>
+              </a:solidFill>
+            </a:ln>
+          </p:spPr>
+          <p:style>
+            <a:lnRef idx="1">
+              <a:schemeClr val="accent1"/>
+            </a:lnRef>
+            <a:fillRef idx="0">
+              <a:schemeClr val="accent1"/>
+            </a:fillRef>
+            <a:effectRef idx="0">
+              <a:schemeClr val="accent1"/>
+            </a:effectRef>
+            <a:fontRef idx="minor">
+              <a:schemeClr val="tx1"/>
+            </a:fontRef>
+          </p:style>
+        </p:cxnSp>
+        <p:cxnSp>
+          <p:nvCxnSpPr>
+            <p:cNvPr id="15" name="Straight Connector 14">
+              <a:extLst>
+                <a:ext uri="{FF2B5EF4-FFF2-40B4-BE49-F238E27FC236}">
+                  <a16:creationId xmlns:a16="http://schemas.microsoft.com/office/drawing/2014/main" id="{1CDCB933-2701-4FB1-A93E-8981AC0B784B}"/>
+                </a:ext>
+              </a:extLst>
+            </p:cNvPr>
+            <p:cNvCxnSpPr/>
+            <p:nvPr/>
+          </p:nvCxnSpPr>
+          <p:spPr>
+            <a:xfrm>
+              <a:off x="2257746" y="3740988"/>
+              <a:ext cx="1520624" cy="0"/>
+            </a:xfrm>
+            <a:prstGeom prst="line">
+              <a:avLst/>
+            </a:prstGeom>
+            <a:ln w="133350">
+              <a:solidFill>
+                <a:schemeClr val="bg1"/>
+              </a:solidFill>
+            </a:ln>
+          </p:spPr>
+          <p:style>
+            <a:lnRef idx="1">
+              <a:schemeClr val="accent1"/>
+            </a:lnRef>
+            <a:fillRef idx="0">
+              <a:schemeClr val="accent1"/>
+            </a:fillRef>
+            <a:effectRef idx="0">
+              <a:schemeClr val="accent1"/>
+            </a:effectRef>
+            <a:fontRef idx="minor">
+              <a:schemeClr val="tx1"/>
+            </a:fontRef>
+          </p:style>
+        </p:cxnSp>
+        <p:cxnSp>
+          <p:nvCxnSpPr>
+            <p:cNvPr id="17" name="Straight Connector 16">
+              <a:extLst>
+                <a:ext uri="{FF2B5EF4-FFF2-40B4-BE49-F238E27FC236}">
+                  <a16:creationId xmlns:a16="http://schemas.microsoft.com/office/drawing/2014/main" id="{43BB0947-BF4E-4351-B331-977B349966D6}"/>
+                </a:ext>
+              </a:extLst>
+            </p:cNvPr>
+            <p:cNvCxnSpPr>
+              <a:cxnSpLocks/>
+            </p:cNvCxnSpPr>
+            <p:nvPr/>
+          </p:nvCxnSpPr>
+          <p:spPr>
+            <a:xfrm>
+              <a:off x="2257746" y="1130060"/>
+              <a:ext cx="1520624" cy="2704161"/>
+            </a:xfrm>
+            <a:prstGeom prst="line">
+              <a:avLst/>
+            </a:prstGeom>
+            <a:ln w="133350">
+              <a:solidFill>
+                <a:schemeClr val="bg1"/>
+              </a:solidFill>
+            </a:ln>
+          </p:spPr>
+          <p:style>
+            <a:lnRef idx="1">
+              <a:schemeClr val="accent1"/>
+            </a:lnRef>
+            <a:fillRef idx="0">
+              <a:schemeClr val="accent1"/>
+            </a:fillRef>
+            <a:effectRef idx="0">
+              <a:schemeClr val="accent1"/>
+            </a:effectRef>
+            <a:fontRef idx="minor">
+              <a:schemeClr val="tx1"/>
+            </a:fontRef>
+          </p:style>
+        </p:cxnSp>
+        <p:cxnSp>
+          <p:nvCxnSpPr>
+            <p:cNvPr id="18" name="Straight Connector 17">
+              <a:extLst>
+                <a:ext uri="{FF2B5EF4-FFF2-40B4-BE49-F238E27FC236}">
+                  <a16:creationId xmlns:a16="http://schemas.microsoft.com/office/drawing/2014/main" id="{A74E5C15-115C-46B4-A725-82FE6EA4C3E4}"/>
+                </a:ext>
+              </a:extLst>
+            </p:cNvPr>
+            <p:cNvCxnSpPr>
+              <a:cxnSpLocks/>
+            </p:cNvCxnSpPr>
+            <p:nvPr/>
+          </p:nvCxnSpPr>
+          <p:spPr>
+            <a:xfrm flipV="1">
+              <a:off x="2257746" y="1130059"/>
+              <a:ext cx="1520624" cy="2704161"/>
+            </a:xfrm>
+            <a:prstGeom prst="line">
+              <a:avLst/>
+            </a:prstGeom>
+            <a:ln w="133350">
+              <a:solidFill>
+                <a:schemeClr val="bg1"/>
+              </a:solidFill>
+            </a:ln>
+          </p:spPr>
+          <p:style>
+            <a:lnRef idx="1">
+              <a:schemeClr val="accent1"/>
+            </a:lnRef>
+            <a:fillRef idx="0">
+              <a:schemeClr val="accent1"/>
+            </a:fillRef>
+            <a:effectRef idx="0">
+              <a:schemeClr val="accent1"/>
+            </a:effectRef>
+            <a:fontRef idx="minor">
+              <a:schemeClr val="tx1"/>
+            </a:fontRef>
+          </p:style>
+        </p:cxnSp>
+      </p:grpSp>
     </p:spTree>
     <p:extLst>
       <p:ext uri="{BB962C8B-B14F-4D97-AF65-F5344CB8AC3E}">

</xml_diff>